<commit_message>
bilder in praese eingefuegt
</commit_message>
<xml_diff>
--- a/praesentationen/Lecker!_1_Design&Mockup.pptx
+++ b/praesentationen/Lecker!_1_Design&Mockup.pptx
@@ -5,13 +5,22 @@
     <p:sldMasterId id="2147483648" r:id="rId1"/>
   </p:sldMasterIdLst>
   <p:handoutMasterIdLst>
-    <p:handoutMasterId r:id="rId6"/>
+    <p:handoutMasterId r:id="rId15"/>
   </p:handoutMasterIdLst>
   <p:sldIdLst>
     <p:sldId id="256" r:id="rId2"/>
     <p:sldId id="257" r:id="rId3"/>
     <p:sldId id="259" r:id="rId4"/>
-    <p:sldId id="258" r:id="rId5"/>
+    <p:sldId id="261" r:id="rId5"/>
+    <p:sldId id="262" r:id="rId6"/>
+    <p:sldId id="263" r:id="rId7"/>
+    <p:sldId id="265" r:id="rId8"/>
+    <p:sldId id="264" r:id="rId9"/>
+    <p:sldId id="266" r:id="rId10"/>
+    <p:sldId id="268" r:id="rId11"/>
+    <p:sldId id="267" r:id="rId12"/>
+    <p:sldId id="269" r:id="rId13"/>
+    <p:sldId id="258" r:id="rId14"/>
   </p:sldIdLst>
   <p:sldSz cx="9144000" cy="6858000" type="screen4x3"/>
   <p:notesSz cx="6858000" cy="9144000"/>
@@ -195,7 +204,8 @@
           <a:p>
             <a:fld id="{B0AE7C61-DD79-42B1-A85C-31EAF696ADDF}" type="datetimeFigureOut">
               <a:rPr lang="de-DE" smtClean="0"/>
-              <a:t>29.04.2013</a:t>
+              <a:pPr/>
+              <a:t>30.04.2013</a:t>
             </a:fld>
             <a:endParaRPr lang="de-DE"/>
           </a:p>
@@ -261,6 +271,7 @@
           <a:p>
             <a:fld id="{EA08265D-DDBB-4105-AE7B-3D19BC162C55}" type="slidenum">
               <a:rPr lang="de-DE" smtClean="0"/>
+              <a:pPr/>
               <a:t>‹Nr.›</a:t>
             </a:fld>
             <a:endParaRPr lang="de-DE"/>
@@ -316,7 +327,7 @@
             <a:fld id="{1BA50D42-C9CD-4801-B293-61D1F53EC57E}" type="datetimeFigureOut">
               <a:rPr lang="de-DE" smtClean="0"/>
               <a:pPr/>
-              <a:t>29.04.2013</a:t>
+              <a:t>30.04.2013</a:t>
             </a:fld>
             <a:endParaRPr lang="de-DE"/>
           </a:p>
@@ -555,7 +566,7 @@
             <a:fld id="{1BA50D42-C9CD-4801-B293-61D1F53EC57E}" type="datetimeFigureOut">
               <a:rPr lang="de-DE" smtClean="0"/>
               <a:pPr/>
-              <a:t>29.04.2013</a:t>
+              <a:t>30.04.2013</a:t>
             </a:fld>
             <a:endParaRPr lang="de-DE"/>
           </a:p>
@@ -732,7 +743,7 @@
             <a:fld id="{1BA50D42-C9CD-4801-B293-61D1F53EC57E}" type="datetimeFigureOut">
               <a:rPr lang="de-DE" smtClean="0"/>
               <a:pPr/>
-              <a:t>29.04.2013</a:t>
+              <a:t>30.04.2013</a:t>
             </a:fld>
             <a:endParaRPr lang="de-DE"/>
           </a:p>
@@ -1368,7 +1379,7 @@
             <a:fld id="{1BA50D42-C9CD-4801-B293-61D1F53EC57E}" type="datetimeFigureOut">
               <a:rPr lang="de-DE" smtClean="0"/>
               <a:pPr/>
-              <a:t>29.04.2013</a:t>
+              <a:t>30.04.2013</a:t>
             </a:fld>
             <a:endParaRPr lang="de-DE"/>
           </a:p>
@@ -1744,7 +1755,7 @@
             <a:fld id="{1BA50D42-C9CD-4801-B293-61D1F53EC57E}" type="datetimeFigureOut">
               <a:rPr lang="de-DE" smtClean="0"/>
               <a:pPr/>
-              <a:t>29.04.2013</a:t>
+              <a:t>30.04.2013</a:t>
             </a:fld>
             <a:endParaRPr lang="de-DE"/>
           </a:p>
@@ -2163,7 +2174,7 @@
             <a:fld id="{1BA50D42-C9CD-4801-B293-61D1F53EC57E}" type="datetimeFigureOut">
               <a:rPr lang="de-DE" smtClean="0"/>
               <a:pPr/>
-              <a:t>29.04.2013</a:t>
+              <a:t>30.04.2013</a:t>
             </a:fld>
             <a:endParaRPr lang="de-DE"/>
           </a:p>
@@ -2278,7 +2289,7 @@
             <a:fld id="{1BA50D42-C9CD-4801-B293-61D1F53EC57E}" type="datetimeFigureOut">
               <a:rPr lang="de-DE" smtClean="0"/>
               <a:pPr/>
-              <a:t>29.04.2013</a:t>
+              <a:t>30.04.2013</a:t>
             </a:fld>
             <a:endParaRPr lang="de-DE"/>
           </a:p>
@@ -2370,7 +2381,7 @@
             <a:fld id="{1BA50D42-C9CD-4801-B293-61D1F53EC57E}" type="datetimeFigureOut">
               <a:rPr lang="de-DE" smtClean="0"/>
               <a:pPr/>
-              <a:t>29.04.2013</a:t>
+              <a:t>30.04.2013</a:t>
             </a:fld>
             <a:endParaRPr lang="de-DE"/>
           </a:p>
@@ -2644,7 +2655,7 @@
             <a:fld id="{1BA50D42-C9CD-4801-B293-61D1F53EC57E}" type="datetimeFigureOut">
               <a:rPr lang="de-DE" smtClean="0"/>
               <a:pPr/>
-              <a:t>29.04.2013</a:t>
+              <a:t>30.04.2013</a:t>
             </a:fld>
             <a:endParaRPr lang="de-DE"/>
           </a:p>
@@ -2894,7 +2905,7 @@
             <a:fld id="{1BA50D42-C9CD-4801-B293-61D1F53EC57E}" type="datetimeFigureOut">
               <a:rPr lang="de-DE" smtClean="0"/>
               <a:pPr/>
-              <a:t>29.04.2013</a:t>
+              <a:t>30.04.2013</a:t>
             </a:fld>
             <a:endParaRPr lang="de-DE"/>
           </a:p>
@@ -3104,7 +3115,7 @@
             <a:fld id="{1BA50D42-C9CD-4801-B293-61D1F53EC57E}" type="datetimeFigureOut">
               <a:rPr lang="de-DE" smtClean="0"/>
               <a:pPr/>
-              <a:t>29.04.2013</a:t>
+              <a:t>30.04.2013</a:t>
             </a:fld>
             <a:endParaRPr lang="de-DE"/>
           </a:p>
@@ -3574,6 +3585,339 @@
 </p:sld>
 </file>
 
+<file path=ppt/slides/slide10.xml><?xml version="1.0" encoding="utf-8"?>
+<p:sld xmlns:a="http://schemas.openxmlformats.org/drawingml/2006/main" xmlns:r="http://schemas.openxmlformats.org/officeDocument/2006/relationships" xmlns:p="http://schemas.openxmlformats.org/presentationml/2006/main">
+  <p:cSld>
+    <p:spTree>
+      <p:nvGrpSpPr>
+        <p:cNvPr id="1" name=""/>
+        <p:cNvGrpSpPr/>
+        <p:nvPr/>
+      </p:nvGrpSpPr>
+      <p:grpSpPr>
+        <a:xfrm>
+          <a:off x="0" y="0"/>
+          <a:ext cx="0" cy="0"/>
+          <a:chOff x="0" y="0"/>
+          <a:chExt cx="0" cy="0"/>
+        </a:xfrm>
+      </p:grpSpPr>
+      <p:sp>
+        <p:nvSpPr>
+          <p:cNvPr id="3" name="Titel 2"/>
+          <p:cNvSpPr>
+            <a:spLocks noGrp="1"/>
+          </p:cNvSpPr>
+          <p:nvPr>
+            <p:ph type="title"/>
+          </p:nvPr>
+        </p:nvSpPr>
+        <p:spPr/>
+        <p:txBody>
+          <a:bodyPr/>
+          <a:lstStyle/>
+          <a:p>
+            <a:r>
+              <a:rPr lang="de-DE" dirty="0" smtClean="0"/>
+              <a:t>Design / </a:t>
+            </a:r>
+            <a:r>
+              <a:rPr lang="de-DE" dirty="0" err="1" smtClean="0"/>
+              <a:t>Mockups</a:t>
+            </a:r>
+            <a:endParaRPr lang="de-DE" dirty="0"/>
+          </a:p>
+        </p:txBody>
+      </p:sp>
+      <p:pic>
+        <p:nvPicPr>
+          <p:cNvPr id="4099" name="Picture 3" descr="C:\Users\Acanis\Documents\Studium\5. Semester\Internet-Technologien\Präsentation\MainFirst.png"/>
+          <p:cNvPicPr>
+            <a:picLocks noChangeAspect="1" noChangeArrowheads="1"/>
+          </p:cNvPicPr>
+          <p:nvPr/>
+        </p:nvPicPr>
+        <p:blipFill>
+          <a:blip r:embed="rId2"/>
+          <a:stretch>
+            <a:fillRect/>
+          </a:stretch>
+        </p:blipFill>
+        <p:spPr bwMode="auto">
+          <a:xfrm>
+            <a:off x="3331101" y="1071546"/>
+            <a:ext cx="2686068" cy="4857783"/>
+          </a:xfrm>
+          <a:prstGeom prst="rect">
+            <a:avLst/>
+          </a:prstGeom>
+          <a:noFill/>
+        </p:spPr>
+      </p:pic>
+    </p:spTree>
+  </p:cSld>
+  <p:clrMapOvr>
+    <a:masterClrMapping/>
+  </p:clrMapOvr>
+  <p:timing>
+    <p:tnLst>
+      <p:par>
+        <p:cTn id="1" dur="indefinite" restart="never" nodeType="tmRoot"/>
+      </p:par>
+    </p:tnLst>
+  </p:timing>
+</p:sld>
+</file>
+
+<file path=ppt/slides/slide11.xml><?xml version="1.0" encoding="utf-8"?>
+<p:sld xmlns:a="http://schemas.openxmlformats.org/drawingml/2006/main" xmlns:r="http://schemas.openxmlformats.org/officeDocument/2006/relationships" xmlns:p="http://schemas.openxmlformats.org/presentationml/2006/main">
+  <p:cSld>
+    <p:spTree>
+      <p:nvGrpSpPr>
+        <p:cNvPr id="1" name=""/>
+        <p:cNvGrpSpPr/>
+        <p:nvPr/>
+      </p:nvGrpSpPr>
+      <p:grpSpPr>
+        <a:xfrm>
+          <a:off x="0" y="0"/>
+          <a:ext cx="0" cy="0"/>
+          <a:chOff x="0" y="0"/>
+          <a:chExt cx="0" cy="0"/>
+        </a:xfrm>
+      </p:grpSpPr>
+      <p:sp>
+        <p:nvSpPr>
+          <p:cNvPr id="3" name="Titel 2"/>
+          <p:cNvSpPr>
+            <a:spLocks noGrp="1"/>
+          </p:cNvSpPr>
+          <p:nvPr>
+            <p:ph type="title"/>
+          </p:nvPr>
+        </p:nvSpPr>
+        <p:spPr/>
+        <p:txBody>
+          <a:bodyPr/>
+          <a:lstStyle/>
+          <a:p>
+            <a:r>
+              <a:rPr lang="de-DE" dirty="0" smtClean="0"/>
+              <a:t>Design / </a:t>
+            </a:r>
+            <a:r>
+              <a:rPr lang="de-DE" dirty="0" err="1" smtClean="0"/>
+              <a:t>Mockups</a:t>
+            </a:r>
+            <a:endParaRPr lang="de-DE" dirty="0"/>
+          </a:p>
+        </p:txBody>
+      </p:sp>
+      <p:pic>
+        <p:nvPicPr>
+          <p:cNvPr id="4099" name="Picture 3" descr="C:\Users\Acanis\Documents\Studium\5. Semester\Internet-Technologien\Präsentation\MainFirst.png"/>
+          <p:cNvPicPr>
+            <a:picLocks noChangeAspect="1" noChangeArrowheads="1"/>
+          </p:cNvPicPr>
+          <p:nvPr/>
+        </p:nvPicPr>
+        <p:blipFill>
+          <a:blip r:embed="rId2"/>
+          <a:stretch>
+            <a:fillRect/>
+          </a:stretch>
+        </p:blipFill>
+        <p:spPr bwMode="auto">
+          <a:xfrm>
+            <a:off x="3331101" y="1071546"/>
+            <a:ext cx="2686068" cy="4857783"/>
+          </a:xfrm>
+          <a:prstGeom prst="rect">
+            <a:avLst/>
+          </a:prstGeom>
+          <a:noFill/>
+        </p:spPr>
+      </p:pic>
+    </p:spTree>
+  </p:cSld>
+  <p:clrMapOvr>
+    <a:masterClrMapping/>
+  </p:clrMapOvr>
+  <p:timing>
+    <p:tnLst>
+      <p:par>
+        <p:cTn id="1" dur="indefinite" restart="never" nodeType="tmRoot"/>
+      </p:par>
+    </p:tnLst>
+  </p:timing>
+</p:sld>
+</file>
+
+<file path=ppt/slides/slide12.xml><?xml version="1.0" encoding="utf-8"?>
+<p:sld xmlns:a="http://schemas.openxmlformats.org/drawingml/2006/main" xmlns:r="http://schemas.openxmlformats.org/officeDocument/2006/relationships" xmlns:p="http://schemas.openxmlformats.org/presentationml/2006/main">
+  <p:cSld>
+    <p:spTree>
+      <p:nvGrpSpPr>
+        <p:cNvPr id="1" name=""/>
+        <p:cNvGrpSpPr/>
+        <p:nvPr/>
+      </p:nvGrpSpPr>
+      <p:grpSpPr>
+        <a:xfrm>
+          <a:off x="0" y="0"/>
+          <a:ext cx="0" cy="0"/>
+          <a:chOff x="0" y="0"/>
+          <a:chExt cx="0" cy="0"/>
+        </a:xfrm>
+      </p:grpSpPr>
+      <p:sp>
+        <p:nvSpPr>
+          <p:cNvPr id="3" name="Titel 2"/>
+          <p:cNvSpPr>
+            <a:spLocks noGrp="1"/>
+          </p:cNvSpPr>
+          <p:nvPr>
+            <p:ph type="title"/>
+          </p:nvPr>
+        </p:nvSpPr>
+        <p:spPr/>
+        <p:txBody>
+          <a:bodyPr/>
+          <a:lstStyle/>
+          <a:p>
+            <a:r>
+              <a:rPr lang="de-DE" dirty="0" smtClean="0"/>
+              <a:t>Design / </a:t>
+            </a:r>
+            <a:r>
+              <a:rPr lang="de-DE" dirty="0" err="1" smtClean="0"/>
+              <a:t>Mockups</a:t>
+            </a:r>
+            <a:endParaRPr lang="de-DE" dirty="0"/>
+          </a:p>
+        </p:txBody>
+      </p:sp>
+      <p:pic>
+        <p:nvPicPr>
+          <p:cNvPr id="4099" name="Picture 3" descr="C:\Users\Acanis\Documents\Studium\5. Semester\Internet-Technologien\Präsentation\MainFirst.png"/>
+          <p:cNvPicPr>
+            <a:picLocks noChangeAspect="1" noChangeArrowheads="1"/>
+          </p:cNvPicPr>
+          <p:nvPr/>
+        </p:nvPicPr>
+        <p:blipFill>
+          <a:blip r:embed="rId2"/>
+          <a:stretch>
+            <a:fillRect/>
+          </a:stretch>
+        </p:blipFill>
+        <p:spPr bwMode="auto">
+          <a:xfrm>
+            <a:off x="3331101" y="1071546"/>
+            <a:ext cx="2686068" cy="4857783"/>
+          </a:xfrm>
+          <a:prstGeom prst="rect">
+            <a:avLst/>
+          </a:prstGeom>
+          <a:noFill/>
+        </p:spPr>
+      </p:pic>
+    </p:spTree>
+  </p:cSld>
+  <p:clrMapOvr>
+    <a:masterClrMapping/>
+  </p:clrMapOvr>
+  <p:timing>
+    <p:tnLst>
+      <p:par>
+        <p:cTn id="1" dur="indefinite" restart="never" nodeType="tmRoot"/>
+      </p:par>
+    </p:tnLst>
+  </p:timing>
+</p:sld>
+</file>
+
+<file path=ppt/slides/slide13.xml><?xml version="1.0" encoding="utf-8"?>
+<p:sld xmlns:a="http://schemas.openxmlformats.org/drawingml/2006/main" xmlns:r="http://schemas.openxmlformats.org/officeDocument/2006/relationships" xmlns:p="http://schemas.openxmlformats.org/presentationml/2006/main">
+  <p:cSld>
+    <p:spTree>
+      <p:nvGrpSpPr>
+        <p:cNvPr id="1" name=""/>
+        <p:cNvGrpSpPr/>
+        <p:nvPr/>
+      </p:nvGrpSpPr>
+      <p:grpSpPr>
+        <a:xfrm>
+          <a:off x="0" y="0"/>
+          <a:ext cx="0" cy="0"/>
+          <a:chOff x="0" y="0"/>
+          <a:chExt cx="0" cy="0"/>
+        </a:xfrm>
+      </p:grpSpPr>
+      <p:sp>
+        <p:nvSpPr>
+          <p:cNvPr id="3" name="Titel 2"/>
+          <p:cNvSpPr>
+            <a:spLocks noGrp="1"/>
+          </p:cNvSpPr>
+          <p:nvPr>
+            <p:ph type="title"/>
+          </p:nvPr>
+        </p:nvSpPr>
+        <p:spPr/>
+        <p:txBody>
+          <a:bodyPr/>
+          <a:lstStyle/>
+          <a:p>
+            <a:r>
+              <a:rPr lang="de-DE" dirty="0" smtClean="0"/>
+              <a:t>Fragen</a:t>
+            </a:r>
+            <a:endParaRPr lang="de-DE" dirty="0"/>
+          </a:p>
+        </p:txBody>
+      </p:sp>
+      <p:pic>
+        <p:nvPicPr>
+          <p:cNvPr id="3075" name="Picture 3" descr="C:\Users\Acanis\AppData\Local\Microsoft\Windows\Temporary Internet Files\Content.IE5\T0NJ09P7\MC900383550[1].wmf"/>
+          <p:cNvPicPr>
+            <a:picLocks noChangeAspect="1" noChangeArrowheads="1"/>
+          </p:cNvPicPr>
+          <p:nvPr/>
+        </p:nvPicPr>
+        <p:blipFill>
+          <a:blip r:embed="rId2" cstate="print"/>
+          <a:srcRect/>
+          <a:stretch>
+            <a:fillRect/>
+          </a:stretch>
+        </p:blipFill>
+        <p:spPr bwMode="auto">
+          <a:xfrm>
+            <a:off x="3721646" y="1916832"/>
+            <a:ext cx="1700708" cy="3736592"/>
+          </a:xfrm>
+          <a:prstGeom prst="rect">
+            <a:avLst/>
+          </a:prstGeom>
+          <a:noFill/>
+        </p:spPr>
+      </p:pic>
+    </p:spTree>
+  </p:cSld>
+  <p:clrMapOvr>
+    <a:masterClrMapping/>
+  </p:clrMapOvr>
+  <p:timing>
+    <p:tnLst>
+      <p:par>
+        <p:cTn id="1" dur="indefinite" restart="never" nodeType="tmRoot"/>
+      </p:par>
+    </p:tnLst>
+  </p:timing>
+</p:sld>
+</file>
+
 <file path=ppt/slides/slide2.xml><?xml version="1.0" encoding="utf-8"?>
 <p:sld xmlns:a="http://schemas.openxmlformats.org/drawingml/2006/main" xmlns:r="http://schemas.openxmlformats.org/officeDocument/2006/relationships" xmlns:p="http://schemas.openxmlformats.org/presentationml/2006/main">
   <p:cSld>
@@ -3728,16 +4072,15 @@
           <p:nvPr/>
         </p:nvPicPr>
         <p:blipFill>
-          <a:blip r:embed="rId2" cstate="print"/>
-          <a:srcRect/>
+          <a:blip r:embed="rId2"/>
           <a:stretch>
             <a:fillRect/>
           </a:stretch>
         </p:blipFill>
         <p:spPr bwMode="auto">
           <a:xfrm>
-            <a:off x="1331640" y="1268760"/>
-            <a:ext cx="6480720" cy="4457733"/>
+            <a:off x="1142976" y="1071546"/>
+            <a:ext cx="7062320" cy="4857783"/>
           </a:xfrm>
           <a:prstGeom prst="rect">
             <a:avLst/>
@@ -3794,7 +4137,11 @@
           <a:p>
             <a:r>
               <a:rPr lang="de-DE" dirty="0" smtClean="0"/>
-              <a:t>Fragen</a:t>
+              <a:t>Design / </a:t>
+            </a:r>
+            <a:r>
+              <a:rPr lang="de-DE" dirty="0" err="1" smtClean="0"/>
+              <a:t>Mockups</a:t>
             </a:r>
             <a:endParaRPr lang="de-DE" dirty="0"/>
           </a:p>
@@ -3802,23 +4149,442 @@
       </p:sp>
       <p:pic>
         <p:nvPicPr>
-          <p:cNvPr id="3075" name="Picture 3" descr="C:\Users\Acanis\AppData\Local\Microsoft\Windows\Temporary Internet Files\Content.IE5\T0NJ09P7\MC900383550[1].wmf"/>
+          <p:cNvPr id="4099" name="Picture 3" descr="C:\Users\Acanis\Documents\Studium\5. Semester\Internet-Technologien\Präsentation\MainFirst.png"/>
           <p:cNvPicPr>
             <a:picLocks noChangeAspect="1" noChangeArrowheads="1"/>
           </p:cNvPicPr>
           <p:nvPr/>
         </p:nvPicPr>
         <p:blipFill>
-          <a:blip r:embed="rId2" cstate="print"/>
-          <a:srcRect/>
+          <a:blip r:embed="rId2"/>
           <a:stretch>
             <a:fillRect/>
           </a:stretch>
         </p:blipFill>
         <p:spPr bwMode="auto">
           <a:xfrm>
-            <a:off x="3721646" y="1916832"/>
-            <a:ext cx="1700708" cy="3736592"/>
+            <a:off x="1142976" y="1071546"/>
+            <a:ext cx="7062320" cy="4857783"/>
+          </a:xfrm>
+          <a:prstGeom prst="rect">
+            <a:avLst/>
+          </a:prstGeom>
+          <a:noFill/>
+        </p:spPr>
+      </p:pic>
+    </p:spTree>
+  </p:cSld>
+  <p:clrMapOvr>
+    <a:masterClrMapping/>
+  </p:clrMapOvr>
+  <p:timing>
+    <p:tnLst>
+      <p:par>
+        <p:cTn id="1" dur="indefinite" restart="never" nodeType="tmRoot"/>
+      </p:par>
+    </p:tnLst>
+  </p:timing>
+</p:sld>
+</file>
+
+<file path=ppt/slides/slide5.xml><?xml version="1.0" encoding="utf-8"?>
+<p:sld xmlns:a="http://schemas.openxmlformats.org/drawingml/2006/main" xmlns:r="http://schemas.openxmlformats.org/officeDocument/2006/relationships" xmlns:p="http://schemas.openxmlformats.org/presentationml/2006/main">
+  <p:cSld>
+    <p:spTree>
+      <p:nvGrpSpPr>
+        <p:cNvPr id="1" name=""/>
+        <p:cNvGrpSpPr/>
+        <p:nvPr/>
+      </p:nvGrpSpPr>
+      <p:grpSpPr>
+        <a:xfrm>
+          <a:off x="0" y="0"/>
+          <a:ext cx="0" cy="0"/>
+          <a:chOff x="0" y="0"/>
+          <a:chExt cx="0" cy="0"/>
+        </a:xfrm>
+      </p:grpSpPr>
+      <p:sp>
+        <p:nvSpPr>
+          <p:cNvPr id="3" name="Titel 2"/>
+          <p:cNvSpPr>
+            <a:spLocks noGrp="1"/>
+          </p:cNvSpPr>
+          <p:nvPr>
+            <p:ph type="title"/>
+          </p:nvPr>
+        </p:nvSpPr>
+        <p:spPr/>
+        <p:txBody>
+          <a:bodyPr/>
+          <a:lstStyle/>
+          <a:p>
+            <a:r>
+              <a:rPr lang="de-DE" dirty="0" smtClean="0"/>
+              <a:t>Design / </a:t>
+            </a:r>
+            <a:r>
+              <a:rPr lang="de-DE" dirty="0" err="1" smtClean="0"/>
+              <a:t>Mockups</a:t>
+            </a:r>
+            <a:endParaRPr lang="de-DE" dirty="0"/>
+          </a:p>
+        </p:txBody>
+      </p:sp>
+      <p:pic>
+        <p:nvPicPr>
+          <p:cNvPr id="4099" name="Picture 3" descr="C:\Users\Acanis\Documents\Studium\5. Semester\Internet-Technologien\Präsentation\MainFirst.png"/>
+          <p:cNvPicPr>
+            <a:picLocks noChangeAspect="1" noChangeArrowheads="1"/>
+          </p:cNvPicPr>
+          <p:nvPr/>
+        </p:nvPicPr>
+        <p:blipFill>
+          <a:blip r:embed="rId2"/>
+          <a:stretch>
+            <a:fillRect/>
+          </a:stretch>
+        </p:blipFill>
+        <p:spPr bwMode="auto">
+          <a:xfrm>
+            <a:off x="1142976" y="1071546"/>
+            <a:ext cx="7062319" cy="4857783"/>
+          </a:xfrm>
+          <a:prstGeom prst="rect">
+            <a:avLst/>
+          </a:prstGeom>
+          <a:noFill/>
+        </p:spPr>
+      </p:pic>
+    </p:spTree>
+  </p:cSld>
+  <p:clrMapOvr>
+    <a:masterClrMapping/>
+  </p:clrMapOvr>
+  <p:timing>
+    <p:tnLst>
+      <p:par>
+        <p:cTn id="1" dur="indefinite" restart="never" nodeType="tmRoot"/>
+      </p:par>
+    </p:tnLst>
+  </p:timing>
+</p:sld>
+</file>
+
+<file path=ppt/slides/slide6.xml><?xml version="1.0" encoding="utf-8"?>
+<p:sld xmlns:a="http://schemas.openxmlformats.org/drawingml/2006/main" xmlns:r="http://schemas.openxmlformats.org/officeDocument/2006/relationships" xmlns:p="http://schemas.openxmlformats.org/presentationml/2006/main">
+  <p:cSld>
+    <p:spTree>
+      <p:nvGrpSpPr>
+        <p:cNvPr id="1" name=""/>
+        <p:cNvGrpSpPr/>
+        <p:nvPr/>
+      </p:nvGrpSpPr>
+      <p:grpSpPr>
+        <a:xfrm>
+          <a:off x="0" y="0"/>
+          <a:ext cx="0" cy="0"/>
+          <a:chOff x="0" y="0"/>
+          <a:chExt cx="0" cy="0"/>
+        </a:xfrm>
+      </p:grpSpPr>
+      <p:sp>
+        <p:nvSpPr>
+          <p:cNvPr id="3" name="Titel 2"/>
+          <p:cNvSpPr>
+            <a:spLocks noGrp="1"/>
+          </p:cNvSpPr>
+          <p:nvPr>
+            <p:ph type="title"/>
+          </p:nvPr>
+        </p:nvSpPr>
+        <p:spPr/>
+        <p:txBody>
+          <a:bodyPr/>
+          <a:lstStyle/>
+          <a:p>
+            <a:r>
+              <a:rPr lang="de-DE" dirty="0" smtClean="0"/>
+              <a:t>Design / </a:t>
+            </a:r>
+            <a:r>
+              <a:rPr lang="de-DE" dirty="0" err="1" smtClean="0"/>
+              <a:t>Mockups</a:t>
+            </a:r>
+            <a:endParaRPr lang="de-DE" dirty="0"/>
+          </a:p>
+        </p:txBody>
+      </p:sp>
+      <p:pic>
+        <p:nvPicPr>
+          <p:cNvPr id="4099" name="Picture 3" descr="C:\Users\Acanis\Documents\Studium\5. Semester\Internet-Technologien\Präsentation\MainFirst.png"/>
+          <p:cNvPicPr>
+            <a:picLocks noChangeAspect="1" noChangeArrowheads="1"/>
+          </p:cNvPicPr>
+          <p:nvPr/>
+        </p:nvPicPr>
+        <p:blipFill>
+          <a:blip r:embed="rId2"/>
+          <a:stretch>
+            <a:fillRect/>
+          </a:stretch>
+        </p:blipFill>
+        <p:spPr bwMode="auto">
+          <a:xfrm>
+            <a:off x="1142976" y="1071546"/>
+            <a:ext cx="7062319" cy="4857782"/>
+          </a:xfrm>
+          <a:prstGeom prst="rect">
+            <a:avLst/>
+          </a:prstGeom>
+          <a:noFill/>
+        </p:spPr>
+      </p:pic>
+    </p:spTree>
+  </p:cSld>
+  <p:clrMapOvr>
+    <a:masterClrMapping/>
+  </p:clrMapOvr>
+  <p:timing>
+    <p:tnLst>
+      <p:par>
+        <p:cTn id="1" dur="indefinite" restart="never" nodeType="tmRoot"/>
+      </p:par>
+    </p:tnLst>
+  </p:timing>
+</p:sld>
+</file>
+
+<file path=ppt/slides/slide7.xml><?xml version="1.0" encoding="utf-8"?>
+<p:sld xmlns:a="http://schemas.openxmlformats.org/drawingml/2006/main" xmlns:r="http://schemas.openxmlformats.org/officeDocument/2006/relationships" xmlns:p="http://schemas.openxmlformats.org/presentationml/2006/main">
+  <p:cSld>
+    <p:spTree>
+      <p:nvGrpSpPr>
+        <p:cNvPr id="1" name=""/>
+        <p:cNvGrpSpPr/>
+        <p:nvPr/>
+      </p:nvGrpSpPr>
+      <p:grpSpPr>
+        <a:xfrm>
+          <a:off x="0" y="0"/>
+          <a:ext cx="0" cy="0"/>
+          <a:chOff x="0" y="0"/>
+          <a:chExt cx="0" cy="0"/>
+        </a:xfrm>
+      </p:grpSpPr>
+      <p:sp>
+        <p:nvSpPr>
+          <p:cNvPr id="3" name="Titel 2"/>
+          <p:cNvSpPr>
+            <a:spLocks noGrp="1"/>
+          </p:cNvSpPr>
+          <p:nvPr>
+            <p:ph type="title"/>
+          </p:nvPr>
+        </p:nvSpPr>
+        <p:spPr/>
+        <p:txBody>
+          <a:bodyPr/>
+          <a:lstStyle/>
+          <a:p>
+            <a:r>
+              <a:rPr lang="de-DE" dirty="0" smtClean="0"/>
+              <a:t>Design / </a:t>
+            </a:r>
+            <a:r>
+              <a:rPr lang="de-DE" dirty="0" err="1" smtClean="0"/>
+              <a:t>Mockups</a:t>
+            </a:r>
+            <a:endParaRPr lang="de-DE" dirty="0"/>
+          </a:p>
+        </p:txBody>
+      </p:sp>
+      <p:pic>
+        <p:nvPicPr>
+          <p:cNvPr id="4099" name="Picture 3" descr="C:\Users\Acanis\Documents\Studium\5. Semester\Internet-Technologien\Präsentation\MainFirst.png"/>
+          <p:cNvPicPr>
+            <a:picLocks noChangeAspect="1" noChangeArrowheads="1"/>
+          </p:cNvPicPr>
+          <p:nvPr/>
+        </p:nvPicPr>
+        <p:blipFill>
+          <a:blip r:embed="rId2"/>
+          <a:stretch>
+            <a:fillRect/>
+          </a:stretch>
+        </p:blipFill>
+        <p:spPr bwMode="auto">
+          <a:xfrm>
+            <a:off x="1142976" y="1071546"/>
+            <a:ext cx="7062319" cy="4857782"/>
+          </a:xfrm>
+          <a:prstGeom prst="rect">
+            <a:avLst/>
+          </a:prstGeom>
+          <a:noFill/>
+        </p:spPr>
+      </p:pic>
+    </p:spTree>
+  </p:cSld>
+  <p:clrMapOvr>
+    <a:masterClrMapping/>
+  </p:clrMapOvr>
+  <p:timing>
+    <p:tnLst>
+      <p:par>
+        <p:cTn id="1" dur="indefinite" restart="never" nodeType="tmRoot"/>
+      </p:par>
+    </p:tnLst>
+  </p:timing>
+</p:sld>
+</file>
+
+<file path=ppt/slides/slide8.xml><?xml version="1.0" encoding="utf-8"?>
+<p:sld xmlns:a="http://schemas.openxmlformats.org/drawingml/2006/main" xmlns:r="http://schemas.openxmlformats.org/officeDocument/2006/relationships" xmlns:p="http://schemas.openxmlformats.org/presentationml/2006/main">
+  <p:cSld>
+    <p:spTree>
+      <p:nvGrpSpPr>
+        <p:cNvPr id="1" name=""/>
+        <p:cNvGrpSpPr/>
+        <p:nvPr/>
+      </p:nvGrpSpPr>
+      <p:grpSpPr>
+        <a:xfrm>
+          <a:off x="0" y="0"/>
+          <a:ext cx="0" cy="0"/>
+          <a:chOff x="0" y="0"/>
+          <a:chExt cx="0" cy="0"/>
+        </a:xfrm>
+      </p:grpSpPr>
+      <p:sp>
+        <p:nvSpPr>
+          <p:cNvPr id="3" name="Titel 2"/>
+          <p:cNvSpPr>
+            <a:spLocks noGrp="1"/>
+          </p:cNvSpPr>
+          <p:nvPr>
+            <p:ph type="title"/>
+          </p:nvPr>
+        </p:nvSpPr>
+        <p:spPr/>
+        <p:txBody>
+          <a:bodyPr/>
+          <a:lstStyle/>
+          <a:p>
+            <a:r>
+              <a:rPr lang="de-DE" dirty="0" smtClean="0"/>
+              <a:t>Design / </a:t>
+            </a:r>
+            <a:r>
+              <a:rPr lang="de-DE" dirty="0" err="1" smtClean="0"/>
+              <a:t>Mockups</a:t>
+            </a:r>
+            <a:endParaRPr lang="de-DE" dirty="0"/>
+          </a:p>
+        </p:txBody>
+      </p:sp>
+      <p:pic>
+        <p:nvPicPr>
+          <p:cNvPr id="4099" name="Picture 3" descr="C:\Users\Acanis\Documents\Studium\5. Semester\Internet-Technologien\Präsentation\MainFirst.png"/>
+          <p:cNvPicPr>
+            <a:picLocks noChangeAspect="1" noChangeArrowheads="1"/>
+          </p:cNvPicPr>
+          <p:nvPr/>
+        </p:nvPicPr>
+        <p:blipFill>
+          <a:blip r:embed="rId2"/>
+          <a:stretch>
+            <a:fillRect/>
+          </a:stretch>
+        </p:blipFill>
+        <p:spPr bwMode="auto">
+          <a:xfrm>
+            <a:off x="1142976" y="1071546"/>
+            <a:ext cx="7062319" cy="4857782"/>
+          </a:xfrm>
+          <a:prstGeom prst="rect">
+            <a:avLst/>
+          </a:prstGeom>
+          <a:noFill/>
+        </p:spPr>
+      </p:pic>
+    </p:spTree>
+  </p:cSld>
+  <p:clrMapOvr>
+    <a:masterClrMapping/>
+  </p:clrMapOvr>
+  <p:timing>
+    <p:tnLst>
+      <p:par>
+        <p:cTn id="1" dur="indefinite" restart="never" nodeType="tmRoot"/>
+      </p:par>
+    </p:tnLst>
+  </p:timing>
+</p:sld>
+</file>
+
+<file path=ppt/slides/slide9.xml><?xml version="1.0" encoding="utf-8"?>
+<p:sld xmlns:a="http://schemas.openxmlformats.org/drawingml/2006/main" xmlns:r="http://schemas.openxmlformats.org/officeDocument/2006/relationships" xmlns:p="http://schemas.openxmlformats.org/presentationml/2006/main">
+  <p:cSld>
+    <p:spTree>
+      <p:nvGrpSpPr>
+        <p:cNvPr id="1" name=""/>
+        <p:cNvGrpSpPr/>
+        <p:nvPr/>
+      </p:nvGrpSpPr>
+      <p:grpSpPr>
+        <a:xfrm>
+          <a:off x="0" y="0"/>
+          <a:ext cx="0" cy="0"/>
+          <a:chOff x="0" y="0"/>
+          <a:chExt cx="0" cy="0"/>
+        </a:xfrm>
+      </p:grpSpPr>
+      <p:sp>
+        <p:nvSpPr>
+          <p:cNvPr id="3" name="Titel 2"/>
+          <p:cNvSpPr>
+            <a:spLocks noGrp="1"/>
+          </p:cNvSpPr>
+          <p:nvPr>
+            <p:ph type="title"/>
+          </p:nvPr>
+        </p:nvSpPr>
+        <p:spPr/>
+        <p:txBody>
+          <a:bodyPr/>
+          <a:lstStyle/>
+          <a:p>
+            <a:r>
+              <a:rPr lang="de-DE" dirty="0" smtClean="0"/>
+              <a:t>Design / </a:t>
+            </a:r>
+            <a:r>
+              <a:rPr lang="de-DE" dirty="0" err="1" smtClean="0"/>
+              <a:t>Mockups</a:t>
+            </a:r>
+            <a:endParaRPr lang="de-DE" dirty="0"/>
+          </a:p>
+        </p:txBody>
+      </p:sp>
+      <p:pic>
+        <p:nvPicPr>
+          <p:cNvPr id="4099" name="Picture 3" descr="C:\Users\Acanis\Documents\Studium\5. Semester\Internet-Technologien\Präsentation\MainFirst.png"/>
+          <p:cNvPicPr>
+            <a:picLocks noChangeAspect="1" noChangeArrowheads="1"/>
+          </p:cNvPicPr>
+          <p:nvPr/>
+        </p:nvPicPr>
+        <p:blipFill>
+          <a:blip r:embed="rId2"/>
+          <a:stretch>
+            <a:fillRect/>
+          </a:stretch>
+        </p:blipFill>
+        <p:spPr bwMode="auto">
+          <a:xfrm>
+            <a:off x="3331101" y="1071546"/>
+            <a:ext cx="2686068" cy="4857783"/>
           </a:xfrm>
           <a:prstGeom prst="rect">
             <a:avLst/>

</xml_diff>